<commit_message>
Modifica dei colori della presentazione
</commit_message>
<xml_diff>
--- a/Presentazione/Presentazione IUM.pptx
+++ b/Presentazione/Presentazione IUM.pptx
@@ -1072,7 +1072,9 @@
             <c:bubble3D val="0"/>
             <c:spPr>
               <a:solidFill>
-                <a:schemeClr val="accent6"/>
+                <a:schemeClr val="accent6">
+                  <a:shade val="65000"/>
+                </a:schemeClr>
               </a:solidFill>
               <a:ln w="19050">
                 <a:solidFill>
@@ -1300,7 +1302,7 @@
           </c:tx>
           <c:spPr>
             <a:solidFill>
-              <a:schemeClr val="accent1"/>
+              <a:schemeClr val="accent6"/>
             </a:solidFill>
             <a:ln>
               <a:noFill/>
@@ -1308,6 +1310,44 @@
             <a:effectLst/>
           </c:spPr>
           <c:invertIfNegative val="0"/>
+          <c:dPt>
+            <c:idx val="0"/>
+            <c:invertIfNegative val="0"/>
+            <c:bubble3D val="0"/>
+            <c:spPr>
+              <a:solidFill>
+                <a:srgbClr val="028BCA"/>
+              </a:solidFill>
+              <a:ln>
+                <a:noFill/>
+              </a:ln>
+              <a:effectLst/>
+            </c:spPr>
+            <c:extLst>
+              <c:ext xmlns:c16="http://schemas.microsoft.com/office/drawing/2014/chart" uri="{C3380CC4-5D6E-409C-BE32-E72D297353CC}">
+                <c16:uniqueId val="{00000000-EAE5-418B-ACC2-220A6E005C4E}"/>
+              </c:ext>
+            </c:extLst>
+          </c:dPt>
+          <c:dPt>
+            <c:idx val="1"/>
+            <c:invertIfNegative val="0"/>
+            <c:bubble3D val="0"/>
+            <c:spPr>
+              <a:solidFill>
+                <a:srgbClr val="263238"/>
+              </a:solidFill>
+              <a:ln>
+                <a:noFill/>
+              </a:ln>
+              <a:effectLst/>
+            </c:spPr>
+            <c:extLst>
+              <c:ext xmlns:c16="http://schemas.microsoft.com/office/drawing/2014/chart" uri="{C3380CC4-5D6E-409C-BE32-E72D297353CC}">
+                <c16:uniqueId val="{00000002-EAE5-418B-ACC2-220A6E005C4E}"/>
+              </c:ext>
+            </c:extLst>
+          </c:dPt>
           <c:cat>
             <c:strRef>
               <c:f>Foglio1!$A$2:$A$4</c:f>
@@ -1518,13 +1558,10 @@
 </file>
 
 <file path=ppt/charts/colors2.xml><?xml version="1.0" encoding="utf-8"?>
-<cs:colorStyle xmlns:cs="http://schemas.microsoft.com/office/drawing/2012/chartStyle" xmlns:a="http://schemas.openxmlformats.org/drawingml/2006/main" meth="cycle" id="10">
-  <a:schemeClr val="accent1"/>
-  <a:schemeClr val="accent2"/>
-  <a:schemeClr val="accent3"/>
+<cs:colorStyle xmlns:cs="http://schemas.microsoft.com/office/drawing/2012/chartStyle" xmlns:a="http://schemas.openxmlformats.org/drawingml/2006/main" meth="cycle" id="13">
+  <a:schemeClr val="accent6"/>
+  <a:schemeClr val="accent5"/>
   <a:schemeClr val="accent4"/>
-  <a:schemeClr val="accent5"/>
-  <a:schemeClr val="accent6"/>
   <cs:variation/>
   <cs:variation>
     <a:lumMod val="60000"/>
@@ -2663,7 +2700,7 @@
           <a:p>
             <a:fld id="{EF3E2D55-D778-AF4A-8B1C-E3ACFFEFA0CD}" type="datetimeFigureOut">
               <a:rPr lang="en-US" smtClean="0"/>
-              <a:t>1/12/2020</a:t>
+              <a:t>1/13/2020</a:t>
             </a:fld>
             <a:endParaRPr lang="en-US"/>
           </a:p>
@@ -4499,7 +4536,7 @@
           <a:p>
             <a:fld id="{C764DE79-268F-4C1A-8933-263129D2AF90}" type="datetimeFigureOut">
               <a:rPr lang="en-US" dirty="0"/>
-              <a:t>1/12/2020</a:t>
+              <a:t>1/13/2020</a:t>
             </a:fld>
             <a:endParaRPr lang="en-US" dirty="0"/>
           </a:p>
@@ -4670,7 +4707,7 @@
           <a:p>
             <a:fld id="{C764DE79-268F-4C1A-8933-263129D2AF90}" type="datetimeFigureOut">
               <a:rPr lang="en-US" dirty="0"/>
-              <a:t>1/12/2020</a:t>
+              <a:t>1/13/2020</a:t>
             </a:fld>
             <a:endParaRPr lang="en-US" dirty="0"/>
           </a:p>
@@ -4915,7 +4952,7 @@
           <a:p>
             <a:fld id="{C764DE79-268F-4C1A-8933-263129D2AF90}" type="datetimeFigureOut">
               <a:rPr lang="en-US" dirty="0"/>
-              <a:t>1/12/2020</a:t>
+              <a:t>1/13/2020</a:t>
             </a:fld>
             <a:endParaRPr lang="en-US" dirty="0"/>
           </a:p>
@@ -5148,7 +5185,7 @@
           <a:p>
             <a:fld id="{C764DE79-268F-4C1A-8933-263129D2AF90}" type="datetimeFigureOut">
               <a:rPr lang="en-US" dirty="0"/>
-              <a:t>1/12/2020</a:t>
+              <a:t>1/13/2020</a:t>
             </a:fld>
             <a:endParaRPr lang="en-US" dirty="0"/>
           </a:p>
@@ -5516,7 +5553,7 @@
           <a:p>
             <a:fld id="{C764DE79-268F-4C1A-8933-263129D2AF90}" type="datetimeFigureOut">
               <a:rPr lang="en-US" dirty="0"/>
-              <a:t>1/12/2020</a:t>
+              <a:t>1/13/2020</a:t>
             </a:fld>
             <a:endParaRPr lang="en-US" dirty="0"/>
           </a:p>
@@ -5635,7 +5672,7 @@
           <a:p>
             <a:fld id="{C764DE79-268F-4C1A-8933-263129D2AF90}" type="datetimeFigureOut">
               <a:rPr lang="en-US" dirty="0"/>
-              <a:t>1/12/2020</a:t>
+              <a:t>1/13/2020</a:t>
             </a:fld>
             <a:endParaRPr lang="en-US" dirty="0"/>
           </a:p>
@@ -5731,7 +5768,7 @@
           <a:p>
             <a:fld id="{C764DE79-268F-4C1A-8933-263129D2AF90}" type="datetimeFigureOut">
               <a:rPr lang="en-US" dirty="0"/>
-              <a:t>1/12/2020</a:t>
+              <a:t>1/13/2020</a:t>
             </a:fld>
             <a:endParaRPr lang="en-US" dirty="0"/>
           </a:p>
@@ -6320,7 +6357,7 @@
           <a:p>
             <a:fld id="{C764DE79-268F-4C1A-8933-263129D2AF90}" type="datetimeFigureOut">
               <a:rPr lang="en-US" dirty="0"/>
-              <a:t>1/12/2020</a:t>
+              <a:t>1/13/2020</a:t>
             </a:fld>
             <a:endParaRPr lang="en-US" dirty="0"/>
           </a:p>
@@ -6578,7 +6615,7 @@
           <a:p>
             <a:fld id="{C764DE79-268F-4C1A-8933-263129D2AF90}" type="datetimeFigureOut">
               <a:rPr lang="en-US" dirty="0"/>
-              <a:t>1/12/2020</a:t>
+              <a:t>1/13/2020</a:t>
             </a:fld>
             <a:endParaRPr lang="en-US" dirty="0"/>
           </a:p>
@@ -6749,7 +6786,7 @@
           <a:p>
             <a:fld id="{C764DE79-268F-4C1A-8933-263129D2AF90}" type="datetimeFigureOut">
               <a:rPr lang="en-US" dirty="0"/>
-              <a:t>1/12/2020</a:t>
+              <a:t>1/13/2020</a:t>
             </a:fld>
             <a:endParaRPr lang="en-US" dirty="0"/>
           </a:p>
@@ -6930,7 +6967,7 @@
           <a:p>
             <a:fld id="{C764DE79-268F-4C1A-8933-263129D2AF90}" type="datetimeFigureOut">
               <a:rPr lang="en-US" dirty="0"/>
-              <a:t>1/12/2020</a:t>
+              <a:t>1/13/2020</a:t>
             </a:fld>
             <a:endParaRPr lang="en-US" dirty="0"/>
           </a:p>
@@ -8006,6 +8043,55 @@
           <a:chExt cx="0" cy="0"/>
         </a:xfrm>
       </p:grpSpPr>
+      <p:sp>
+        <p:nvSpPr>
+          <p:cNvPr id="2" name="Slide Number Placeholder 5">
+            <a:extLst>
+              <a:ext uri="{FF2B5EF4-FFF2-40B4-BE49-F238E27FC236}">
+                <a16:creationId xmlns:a16="http://schemas.microsoft.com/office/drawing/2014/main" id="{D2ECD58A-0060-485B-9059-D6F038D0D2D4}"/>
+              </a:ext>
+            </a:extLst>
+          </p:cNvPr>
+          <p:cNvSpPr>
+            <a:spLocks noGrp="1"/>
+          </p:cNvSpPr>
+          <p:nvPr>
+            <p:ph type="sldNum" sz="quarter" idx="4"/>
+          </p:nvPr>
+        </p:nvSpPr>
+        <p:spPr>
+          <a:xfrm>
+            <a:off x="8189264" y="1346525"/>
+            <a:ext cx="543972" cy="365125"/>
+          </a:xfrm>
+          <a:prstGeom prst="rect">
+            <a:avLst/>
+          </a:prstGeom>
+        </p:spPr>
+        <p:txBody>
+          <a:bodyPr anchor="ctr"/>
+          <a:lstStyle>
+            <a:lvl1pPr algn="ctr">
+              <a:defRPr sz="1200" b="0" i="0">
+                <a:solidFill>
+                  <a:schemeClr val="bg1"/>
+                </a:solidFill>
+                <a:latin typeface="Roboto Light" charset="0"/>
+                <a:ea typeface="Roboto Light" charset="0"/>
+                <a:cs typeface="Roboto Light" charset="0"/>
+              </a:defRPr>
+            </a:lvl1pPr>
+          </a:lstStyle>
+          <a:p>
+            <a:fld id="{936C95AE-7298-45E1-9514-94AFF5BED89B}" type="slidenum">
+              <a:rPr lang="en-US" smtClean="0"/>
+              <a:pPr/>
+              <a:t>‹N›</a:t>
+            </a:fld>
+            <a:endParaRPr lang="en-US" dirty="0"/>
+          </a:p>
+        </p:txBody>
+      </p:sp>
     </p:spTree>
     <p:extLst>
       <p:ext uri="{BB962C8B-B14F-4D97-AF65-F5344CB8AC3E}">
@@ -8399,7 +8485,7 @@
         </p:nvSpPr>
         <p:spPr>
           <a:xfrm>
-            <a:off x="866728" y="-10160"/>
+            <a:off x="872009" y="0"/>
             <a:ext cx="5106287" cy="6858000"/>
           </a:xfrm>
           <a:prstGeom prst="homePlate">
@@ -8408,7 +8494,7 @@
             </a:avLst>
           </a:prstGeom>
           <a:solidFill>
-            <a:srgbClr val="E55100"/>
+            <a:srgbClr val="03A9F4"/>
           </a:solidFill>
           <a:ln>
             <a:noFill/>
@@ -11167,7 +11253,7 @@
           <a:p>
             <a:fld id="{C764DE79-268F-4C1A-8933-263129D2AF90}" type="datetimeFigureOut">
               <a:rPr lang="en-US" dirty="0"/>
-              <a:t>1/12/2020</a:t>
+              <a:t>1/13/2020</a:t>
             </a:fld>
             <a:endParaRPr lang="en-US" dirty="0"/>
           </a:p>
@@ -11876,7 +11962,7 @@
           <p:nvPr>
             <p:extLst>
               <p:ext uri="{D42A27DB-BD31-4B8C-83A1-F6EECF244321}">
-                <p14:modId xmlns:p14="http://schemas.microsoft.com/office/powerpoint/2010/main" val="3581499769"/>
+                <p14:modId xmlns:p14="http://schemas.microsoft.com/office/powerpoint/2010/main" val="3303697057"/>
               </p:ext>
             </p:extLst>
           </p:nvPr>
@@ -11921,8 +12007,43 @@
           <a:p>
             <a:r>
               <a:rPr lang="it-IT" dirty="0"/>
-              <a:t>NPS= -83</a:t>
-            </a:r>
+              <a:t>Score NPS= -83</a:t>
+            </a:r>
+          </a:p>
+        </p:txBody>
+      </p:sp>
+      <p:sp>
+        <p:nvSpPr>
+          <p:cNvPr id="6" name="Segnaposto numero diapositiva 2">
+            <a:extLst>
+              <a:ext uri="{FF2B5EF4-FFF2-40B4-BE49-F238E27FC236}">
+                <a16:creationId xmlns:a16="http://schemas.microsoft.com/office/drawing/2014/main" id="{F1132B6F-A5E5-4AA3-A624-A5A4F5F93965}"/>
+              </a:ext>
+            </a:extLst>
+          </p:cNvPr>
+          <p:cNvSpPr>
+            <a:spLocks noGrp="1"/>
+          </p:cNvSpPr>
+          <p:nvPr>
+            <p:ph type="sldNum" sz="quarter" idx="4"/>
+          </p:nvPr>
+        </p:nvSpPr>
+        <p:spPr>
+          <a:xfrm>
+            <a:off x="8189264" y="1346525"/>
+            <a:ext cx="543972" cy="365125"/>
+          </a:xfrm>
+        </p:spPr>
+        <p:txBody>
+          <a:bodyPr/>
+          <a:lstStyle/>
+          <a:p>
+            <a:fld id="{936C95AE-7298-45E1-9514-94AFF5BED89B}" type="slidenum">
+              <a:rPr lang="en-US" sz="1800" smtClean="0"/>
+              <a:pPr/>
+              <a:t>12</a:t>
+            </a:fld>
+            <a:endParaRPr lang="en-US" sz="1800" dirty="0"/>
           </a:p>
         </p:txBody>
       </p:sp>
@@ -12283,6 +12404,41 @@
           </a:p>
         </p:txBody>
       </p:sp>
+      <p:sp>
+        <p:nvSpPr>
+          <p:cNvPr id="6" name="Segnaposto numero diapositiva 2">
+            <a:extLst>
+              <a:ext uri="{FF2B5EF4-FFF2-40B4-BE49-F238E27FC236}">
+                <a16:creationId xmlns:a16="http://schemas.microsoft.com/office/drawing/2014/main" id="{87A40DE7-003C-4DD3-8834-7FD728813557}"/>
+              </a:ext>
+            </a:extLst>
+          </p:cNvPr>
+          <p:cNvSpPr>
+            <a:spLocks noGrp="1"/>
+          </p:cNvSpPr>
+          <p:nvPr>
+            <p:ph type="sldNum" sz="quarter" idx="4"/>
+          </p:nvPr>
+        </p:nvSpPr>
+        <p:spPr>
+          <a:xfrm>
+            <a:off x="8189264" y="1346525"/>
+            <a:ext cx="543972" cy="365125"/>
+          </a:xfrm>
+        </p:spPr>
+        <p:txBody>
+          <a:bodyPr/>
+          <a:lstStyle/>
+          <a:p>
+            <a:fld id="{936C95AE-7298-45E1-9514-94AFF5BED89B}" type="slidenum">
+              <a:rPr lang="en-US" sz="1800" smtClean="0"/>
+              <a:pPr/>
+              <a:t>15</a:t>
+            </a:fld>
+            <a:endParaRPr lang="en-US" sz="1800" dirty="0"/>
+          </a:p>
+        </p:txBody>
+      </p:sp>
     </p:spTree>
     <p:extLst>
       <p:ext uri="{BB962C8B-B14F-4D97-AF65-F5344CB8AC3E}">
@@ -12435,11 +12591,11 @@
           <a:lstStyle/>
           <a:p>
             <a:fld id="{936C95AE-7298-45E1-9514-94AFF5BED89B}" type="slidenum">
-              <a:rPr lang="en-US" smtClean="0"/>
+              <a:rPr lang="en-US" sz="1800" smtClean="0"/>
               <a:pPr/>
               <a:t>17</a:t>
             </a:fld>
-            <a:endParaRPr lang="en-US" dirty="0"/>
+            <a:endParaRPr lang="en-US" sz="1800" dirty="0"/>
           </a:p>
         </p:txBody>
       </p:sp>
@@ -13848,6 +14004,41 @@
           </a:p>
         </p:txBody>
       </p:sp>
+      <p:sp>
+        <p:nvSpPr>
+          <p:cNvPr id="5" name="Segnaposto numero diapositiva 2">
+            <a:extLst>
+              <a:ext uri="{FF2B5EF4-FFF2-40B4-BE49-F238E27FC236}">
+                <a16:creationId xmlns:a16="http://schemas.microsoft.com/office/drawing/2014/main" id="{4442B119-BD2B-40BC-B397-3D3C646BD529}"/>
+              </a:ext>
+            </a:extLst>
+          </p:cNvPr>
+          <p:cNvSpPr>
+            <a:spLocks noGrp="1"/>
+          </p:cNvSpPr>
+          <p:nvPr>
+            <p:ph type="sldNum" sz="quarter" idx="4"/>
+          </p:nvPr>
+        </p:nvSpPr>
+        <p:spPr>
+          <a:xfrm>
+            <a:off x="8189264" y="1346525"/>
+            <a:ext cx="543972" cy="365125"/>
+          </a:xfrm>
+        </p:spPr>
+        <p:txBody>
+          <a:bodyPr/>
+          <a:lstStyle/>
+          <a:p>
+            <a:fld id="{936C95AE-7298-45E1-9514-94AFF5BED89B}" type="slidenum">
+              <a:rPr lang="en-US" sz="1800" smtClean="0"/>
+              <a:pPr/>
+              <a:t>5</a:t>
+            </a:fld>
+            <a:endParaRPr lang="en-US" sz="1800" dirty="0"/>
+          </a:p>
+        </p:txBody>
+      </p:sp>
     </p:spTree>
     <p:extLst>
       <p:ext uri="{BB962C8B-B14F-4D97-AF65-F5344CB8AC3E}">
@@ -15104,6 +15295,41 @@
           </a:prstGeom>
         </p:spPr>
       </p:pic>
+      <p:sp>
+        <p:nvSpPr>
+          <p:cNvPr id="18" name="Segnaposto numero diapositiva 2">
+            <a:extLst>
+              <a:ext uri="{FF2B5EF4-FFF2-40B4-BE49-F238E27FC236}">
+                <a16:creationId xmlns:a16="http://schemas.microsoft.com/office/drawing/2014/main" id="{75A838D5-6951-4456-BDD2-0F658F26606E}"/>
+              </a:ext>
+            </a:extLst>
+          </p:cNvPr>
+          <p:cNvSpPr>
+            <a:spLocks noGrp="1"/>
+          </p:cNvSpPr>
+          <p:nvPr>
+            <p:ph type="sldNum" sz="quarter" idx="4"/>
+          </p:nvPr>
+        </p:nvSpPr>
+        <p:spPr>
+          <a:xfrm>
+            <a:off x="8189264" y="1346525"/>
+            <a:ext cx="543972" cy="365125"/>
+          </a:xfrm>
+        </p:spPr>
+        <p:txBody>
+          <a:bodyPr/>
+          <a:lstStyle/>
+          <a:p>
+            <a:fld id="{936C95AE-7298-45E1-9514-94AFF5BED89B}" type="slidenum">
+              <a:rPr lang="en-US" sz="1800" smtClean="0"/>
+              <a:pPr/>
+              <a:t>7</a:t>
+            </a:fld>
+            <a:endParaRPr lang="en-US" sz="1800" dirty="0"/>
+          </a:p>
+        </p:txBody>
+      </p:sp>
     </p:spTree>
     <p:extLst>
       <p:ext uri="{BB962C8B-B14F-4D97-AF65-F5344CB8AC3E}">
@@ -15287,6 +15513,41 @@
           </a:prstGeom>
         </p:spPr>
       </p:pic>
+      <p:sp>
+        <p:nvSpPr>
+          <p:cNvPr id="4" name="Segnaposto numero diapositiva 2">
+            <a:extLst>
+              <a:ext uri="{FF2B5EF4-FFF2-40B4-BE49-F238E27FC236}">
+                <a16:creationId xmlns:a16="http://schemas.microsoft.com/office/drawing/2014/main" id="{F1C37980-B6A0-4DE3-8CD8-18688219817D}"/>
+              </a:ext>
+            </a:extLst>
+          </p:cNvPr>
+          <p:cNvSpPr>
+            <a:spLocks noGrp="1"/>
+          </p:cNvSpPr>
+          <p:nvPr>
+            <p:ph type="sldNum" sz="quarter" idx="4"/>
+          </p:nvPr>
+        </p:nvSpPr>
+        <p:spPr>
+          <a:xfrm>
+            <a:off x="8189264" y="1346525"/>
+            <a:ext cx="543972" cy="365125"/>
+          </a:xfrm>
+        </p:spPr>
+        <p:txBody>
+          <a:bodyPr/>
+          <a:lstStyle/>
+          <a:p>
+            <a:fld id="{936C95AE-7298-45E1-9514-94AFF5BED89B}" type="slidenum">
+              <a:rPr lang="en-US" sz="1800" smtClean="0"/>
+              <a:pPr/>
+              <a:t>9</a:t>
+            </a:fld>
+            <a:endParaRPr lang="en-US" sz="1800" dirty="0"/>
+          </a:p>
+        </p:txBody>
+      </p:sp>
     </p:spTree>
     <p:extLst>
       <p:ext uri="{BB962C8B-B14F-4D97-AF65-F5344CB8AC3E}">
@@ -15610,7 +15871,7 @@
 <file path=ppt/theme/theme2.xml><?xml version="1.0" encoding="utf-8"?>
 <a:theme xmlns:a="http://schemas.openxmlformats.org/drawingml/2006/main" name="Basic with Circle">
   <a:themeElements>
-    <a:clrScheme name="Personalizzato 1">
+    <a:clrScheme name="Personalizzato 3">
       <a:dk1>
         <a:srgbClr val="000000"/>
       </a:dk1>
@@ -15639,7 +15900,7 @@
         <a:srgbClr val="333333"/>
       </a:accent5>
       <a:accent6>
-        <a:srgbClr val="E55100"/>
+        <a:srgbClr val="03A9F4"/>
       </a:accent6>
       <a:hlink>
         <a:srgbClr val="546E7A"/>

</xml_diff>

<commit_message>
Aggiunto il box plot alla presentazione
</commit_message>
<xml_diff>
--- a/Presentazione/Presentazione IUM.pptx
+++ b/Presentazione/Presentazione IUM.pptx
@@ -1265,290 +1265,177 @@
 </c:chartSpace>
 </file>
 
-<file path=ppt/charts/chart2.xml><?xml version="1.0" encoding="utf-8"?>
-<c:chartSpace xmlns:c="http://schemas.openxmlformats.org/drawingml/2006/chart" xmlns:a="http://schemas.openxmlformats.org/drawingml/2006/main" xmlns:r="http://schemas.openxmlformats.org/officeDocument/2006/relationships" xmlns:c16r2="http://schemas.microsoft.com/office/drawing/2015/06/chart">
-  <c:date1904 val="0"/>
-  <c:lang val="it-IT"/>
-  <c:roundedCorners val="0"/>
-  <mc:AlternateContent xmlns:mc="http://schemas.openxmlformats.org/markup-compatibility/2006">
-    <mc:Choice xmlns:c14="http://schemas.microsoft.com/office/drawing/2007/8/2/chart" Requires="c14">
-      <c14:style val="102"/>
-    </mc:Choice>
-    <mc:Fallback>
-      <c:style val="2"/>
-    </mc:Fallback>
-  </mc:AlternateContent>
-  <c:chart>
-    <c:autoTitleDeleted val="1"/>
-    <c:plotArea>
-      <c:layout/>
-      <c:barChart>
-        <c:barDir val="col"/>
-        <c:grouping val="stacked"/>
-        <c:varyColors val="0"/>
-        <c:ser>
-          <c:idx val="0"/>
-          <c:order val="0"/>
-          <c:tx>
-            <c:strRef>
-              <c:f>Foglio1!$B$1</c:f>
-              <c:strCache>
-                <c:ptCount val="1"/>
-                <c:pt idx="0">
-                  <c:v>NPS</c:v>
-                </c:pt>
-              </c:strCache>
-            </c:strRef>
-          </c:tx>
-          <c:spPr>
+<file path=ppt/charts/chartEx1.xml><?xml version="1.0" encoding="utf-8"?>
+<cx:chartSpace xmlns:a="http://schemas.openxmlformats.org/drawingml/2006/main" xmlns:r="http://schemas.openxmlformats.org/officeDocument/2006/relationships" xmlns:cx="http://schemas.microsoft.com/office/drawing/2014/chartex">
+  <cx:chartData>
+    <cx:externalData r:id="rId1" cx:autoUpdate="0"/>
+    <cx:data id="0">
+      <cx:strDim type="cat">
+        <cx:f>Foglio1!$A$2:$A$23</cx:f>
+        <cx:lvl ptCount="22">
+          <cx:pt idx="0">Tester</cx:pt>
+          <cx:pt idx="1">Tester</cx:pt>
+          <cx:pt idx="2">Tester</cx:pt>
+          <cx:pt idx="3">Tester</cx:pt>
+          <cx:pt idx="4">Tester</cx:pt>
+          <cx:pt idx="5">Tester</cx:pt>
+          <cx:pt idx="6"/>
+          <cx:pt idx="7"/>
+          <cx:pt idx="8"/>
+          <cx:pt idx="9"/>
+          <cx:pt idx="10"/>
+          <cx:pt idx="11"/>
+          <cx:pt idx="12"/>
+          <cx:pt idx="13"/>
+          <cx:pt idx="14"/>
+          <cx:pt idx="15"/>
+          <cx:pt idx="16"/>
+          <cx:pt idx="17"/>
+          <cx:pt idx="18"/>
+          <cx:pt idx="19"/>
+          <cx:pt idx="20"/>
+          <cx:pt idx="21"/>
+        </cx:lvl>
+      </cx:strDim>
+      <cx:numDim type="val">
+        <cx:f>Foglio1!$B$2:$B$23</cx:f>
+        <cx:lvl ptCount="22" formatCode="Standard">
+          <cx:pt idx="0">2</cx:pt>
+          <cx:pt idx="1">7</cx:pt>
+          <cx:pt idx="2">4</cx:pt>
+          <cx:pt idx="3">3</cx:pt>
+          <cx:pt idx="4">6</cx:pt>
+          <cx:pt idx="5">2</cx:pt>
+        </cx:lvl>
+      </cx:numDim>
+    </cx:data>
+    <cx:data id="1">
+      <cx:strDim type="cat">
+        <cx:f>Foglio1!$A$2:$A$23</cx:f>
+        <cx:lvl ptCount="22">
+          <cx:pt idx="0">Tester</cx:pt>
+          <cx:pt idx="1">Tester</cx:pt>
+          <cx:pt idx="2">Tester</cx:pt>
+          <cx:pt idx="3">Tester</cx:pt>
+          <cx:pt idx="4">Tester</cx:pt>
+          <cx:pt idx="5">Tester</cx:pt>
+          <cx:pt idx="6"/>
+          <cx:pt idx="7"/>
+          <cx:pt idx="8"/>
+          <cx:pt idx="9"/>
+          <cx:pt idx="10"/>
+          <cx:pt idx="11"/>
+          <cx:pt idx="12"/>
+          <cx:pt idx="13"/>
+          <cx:pt idx="14"/>
+          <cx:pt idx="15"/>
+          <cx:pt idx="16"/>
+          <cx:pt idx="17"/>
+          <cx:pt idx="18"/>
+          <cx:pt idx="19"/>
+          <cx:pt idx="20"/>
+          <cx:pt idx="21"/>
+        </cx:lvl>
+      </cx:strDim>
+      <cx:numDim type="val">
+        <cx:f>Foglio1!$C$2:$C$23</cx:f>
+        <cx:lvl ptCount="22" formatCode="Standard"/>
+      </cx:numDim>
+    </cx:data>
+    <cx:data id="2">
+      <cx:strDim type="cat">
+        <cx:f>Foglio1!$A$2:$A$23</cx:f>
+        <cx:lvl ptCount="22">
+          <cx:pt idx="0">Tester</cx:pt>
+          <cx:pt idx="1">Tester</cx:pt>
+          <cx:pt idx="2">Tester</cx:pt>
+          <cx:pt idx="3">Tester</cx:pt>
+          <cx:pt idx="4">Tester</cx:pt>
+          <cx:pt idx="5">Tester</cx:pt>
+          <cx:pt idx="6"/>
+          <cx:pt idx="7"/>
+          <cx:pt idx="8"/>
+          <cx:pt idx="9"/>
+          <cx:pt idx="10"/>
+          <cx:pt idx="11"/>
+          <cx:pt idx="12"/>
+          <cx:pt idx="13"/>
+          <cx:pt idx="14"/>
+          <cx:pt idx="15"/>
+          <cx:pt idx="16"/>
+          <cx:pt idx="17"/>
+          <cx:pt idx="18"/>
+          <cx:pt idx="19"/>
+          <cx:pt idx="20"/>
+          <cx:pt idx="21"/>
+        </cx:lvl>
+      </cx:strDim>
+      <cx:numDim type="val">
+        <cx:f>Foglio1!$D$2:$D$23</cx:f>
+        <cx:lvl ptCount="22" formatCode="Standard"/>
+      </cx:numDim>
+    </cx:data>
+  </cx:chartData>
+  <cx:chart>
+    <cx:plotArea>
+      <cx:plotAreaRegion>
+        <cx:series layoutId="boxWhisker" uniqueId="{6892D536-40E9-4456-A931-F92A23B86F08}">
+          <cx:tx>
+            <cx:txData>
+              <cx:f>Foglio1!$B$1</cx:f>
+              <cx:v>Serie1</cx:v>
+            </cx:txData>
+          </cx:tx>
+          <cx:spPr>
             <a:solidFill>
-              <a:schemeClr val="accent6"/>
+              <a:srgbClr val="03A9F4"/>
             </a:solidFill>
-            <a:ln>
-              <a:noFill/>
-            </a:ln>
-            <a:effectLst/>
-          </c:spPr>
-          <c:invertIfNegative val="0"/>
-          <c:dPt>
-            <c:idx val="0"/>
-            <c:invertIfNegative val="0"/>
-            <c:bubble3D val="0"/>
-            <c:spPr>
-              <a:solidFill>
-                <a:srgbClr val="028BCA"/>
-              </a:solidFill>
-              <a:ln>
-                <a:noFill/>
-              </a:ln>
-              <a:effectLst/>
-            </c:spPr>
-            <c:extLst>
-              <c:ext xmlns:c16="http://schemas.microsoft.com/office/drawing/2014/chart" uri="{C3380CC4-5D6E-409C-BE32-E72D297353CC}">
-                <c16:uniqueId val="{00000000-EAE5-418B-ACC2-220A6E005C4E}"/>
-              </c:ext>
-            </c:extLst>
-          </c:dPt>
-          <c:dPt>
-            <c:idx val="1"/>
-            <c:invertIfNegative val="0"/>
-            <c:bubble3D val="0"/>
-            <c:spPr>
-              <a:solidFill>
-                <a:srgbClr val="263238"/>
-              </a:solidFill>
-              <a:ln>
-                <a:noFill/>
-              </a:ln>
-              <a:effectLst/>
-            </c:spPr>
-            <c:extLst>
-              <c:ext xmlns:c16="http://schemas.microsoft.com/office/drawing/2014/chart" uri="{C3380CC4-5D6E-409C-BE32-E72D297353CC}">
-                <c16:uniqueId val="{00000002-EAE5-418B-ACC2-220A6E005C4E}"/>
-              </c:ext>
-            </c:extLst>
-          </c:dPt>
-          <c:cat>
-            <c:strRef>
-              <c:f>Foglio1!$A$2:$A$4</c:f>
-              <c:strCache>
-                <c:ptCount val="3"/>
-                <c:pt idx="0">
-                  <c:v>Detrattori</c:v>
-                </c:pt>
-                <c:pt idx="1">
-                  <c:v>Neutri</c:v>
-                </c:pt>
-                <c:pt idx="2">
-                  <c:v>Promotori</c:v>
-                </c:pt>
-              </c:strCache>
-            </c:strRef>
-          </c:cat>
-          <c:val>
-            <c:numRef>
-              <c:f>Foglio1!$B$2:$B$4</c:f>
-              <c:numCache>
-                <c:formatCode>General</c:formatCode>
-                <c:ptCount val="3"/>
-                <c:pt idx="0">
-                  <c:v>5</c:v>
-                </c:pt>
-                <c:pt idx="1">
-                  <c:v>1</c:v>
-                </c:pt>
-                <c:pt idx="2">
-                  <c:v>0</c:v>
-                </c:pt>
-              </c:numCache>
-            </c:numRef>
-          </c:val>
-          <c:extLst>
-            <c:ext xmlns:c16="http://schemas.microsoft.com/office/drawing/2014/chart" uri="{C3380CC4-5D6E-409C-BE32-E72D297353CC}">
-              <c16:uniqueId val="{00000000-7823-45AD-A557-E10D661001BF}"/>
-            </c:ext>
-          </c:extLst>
-        </c:ser>
-        <c:dLbls>
-          <c:showLegendKey val="0"/>
-          <c:showVal val="0"/>
-          <c:showCatName val="0"/>
-          <c:showSerName val="0"/>
-          <c:showPercent val="0"/>
-          <c:showBubbleSize val="0"/>
-        </c:dLbls>
-        <c:gapWidth val="150"/>
-        <c:overlap val="100"/>
-        <c:axId val="764576248"/>
-        <c:axId val="764576568"/>
-      </c:barChart>
-      <c:catAx>
-        <c:axId val="764576248"/>
-        <c:scaling>
-          <c:orientation val="minMax"/>
-        </c:scaling>
-        <c:delete val="0"/>
-        <c:axPos val="b"/>
-        <c:numFmt formatCode="General" sourceLinked="1"/>
-        <c:majorTickMark val="none"/>
-        <c:minorTickMark val="none"/>
-        <c:tickLblPos val="nextTo"/>
-        <c:spPr>
-          <a:noFill/>
-          <a:ln w="9525" cap="flat" cmpd="sng" algn="ctr">
-            <a:solidFill>
-              <a:schemeClr val="tx1">
-                <a:lumMod val="15000"/>
-                <a:lumOff val="85000"/>
-              </a:schemeClr>
-            </a:solidFill>
-            <a:round/>
-          </a:ln>
-          <a:effectLst/>
-        </c:spPr>
-        <c:txPr>
-          <a:bodyPr rot="-60000000" spcFirstLastPara="1" vertOverflow="ellipsis" vert="horz" wrap="square" anchor="ctr" anchorCtr="1"/>
-          <a:lstStyle/>
-          <a:p>
-            <a:pPr>
-              <a:defRPr sz="1197" b="0" i="0" u="none" strike="noStrike" kern="1200" baseline="0">
-                <a:solidFill>
-                  <a:schemeClr val="tx1">
-                    <a:lumMod val="65000"/>
-                    <a:lumOff val="35000"/>
-                  </a:schemeClr>
-                </a:solidFill>
-                <a:latin typeface="+mn-lt"/>
-                <a:ea typeface="+mn-ea"/>
-                <a:cs typeface="+mn-cs"/>
-              </a:defRPr>
-            </a:pPr>
-            <a:endParaRPr lang="it-IT"/>
-          </a:p>
-        </c:txPr>
-        <c:crossAx val="764576568"/>
-        <c:crosses val="autoZero"/>
-        <c:auto val="1"/>
-        <c:lblAlgn val="ctr"/>
-        <c:lblOffset val="100"/>
-        <c:noMultiLvlLbl val="0"/>
-      </c:catAx>
-      <c:valAx>
-        <c:axId val="764576568"/>
-        <c:scaling>
-          <c:orientation val="minMax"/>
-        </c:scaling>
-        <c:delete val="0"/>
-        <c:axPos val="l"/>
-        <c:majorGridlines>
-          <c:spPr>
-            <a:ln w="9525" cap="flat" cmpd="sng" algn="ctr">
-              <a:solidFill>
-                <a:schemeClr val="tx1">
-                  <a:lumMod val="15000"/>
-                  <a:lumOff val="85000"/>
-                </a:schemeClr>
-              </a:solidFill>
-              <a:round/>
-            </a:ln>
-            <a:effectLst/>
-          </c:spPr>
-        </c:majorGridlines>
-        <c:numFmt formatCode="General" sourceLinked="1"/>
-        <c:majorTickMark val="none"/>
-        <c:minorTickMark val="none"/>
-        <c:tickLblPos val="nextTo"/>
-        <c:spPr>
-          <a:noFill/>
-          <a:ln>
-            <a:noFill/>
-          </a:ln>
-          <a:effectLst/>
-        </c:spPr>
-        <c:txPr>
-          <a:bodyPr rot="-60000000" spcFirstLastPara="1" vertOverflow="ellipsis" vert="horz" wrap="square" anchor="ctr" anchorCtr="1"/>
-          <a:lstStyle/>
-          <a:p>
-            <a:pPr>
-              <a:defRPr sz="1197" b="0" i="0" u="none" strike="noStrike" kern="1200" baseline="0">
-                <a:solidFill>
-                  <a:schemeClr val="tx1">
-                    <a:lumMod val="65000"/>
-                    <a:lumOff val="35000"/>
-                  </a:schemeClr>
-                </a:solidFill>
-                <a:latin typeface="+mn-lt"/>
-                <a:ea typeface="+mn-ea"/>
-                <a:cs typeface="+mn-cs"/>
-              </a:defRPr>
-            </a:pPr>
-            <a:endParaRPr lang="it-IT"/>
-          </a:p>
-        </c:txPr>
-        <c:crossAx val="764576248"/>
-        <c:crosses val="autoZero"/>
-        <c:crossBetween val="between"/>
-      </c:valAx>
-      <c:spPr>
-        <a:noFill/>
-        <a:ln>
-          <a:noFill/>
-        </a:ln>
-        <a:effectLst/>
-      </c:spPr>
-    </c:plotArea>
-    <c:plotVisOnly val="1"/>
-    <c:dispBlanksAs val="gap"/>
-    <c:extLst>
-      <c:ext xmlns:c16r3="http://schemas.microsoft.com/office/drawing/2017/03/chart" uri="{56B9EC1D-385E-4148-901F-78D8002777C0}">
-        <c16r3:dataDisplayOptions16>
-          <c16r3:dispNaAsBlank val="1"/>
-        </c16r3:dataDisplayOptions16>
-      </c:ext>
-    </c:extLst>
-    <c:showDLblsOverMax val="0"/>
-  </c:chart>
-  <c:spPr>
-    <a:noFill/>
-    <a:ln>
-      <a:noFill/>
-    </a:ln>
-    <a:effectLst/>
-  </c:spPr>
-  <c:txPr>
-    <a:bodyPr/>
-    <a:lstStyle/>
-    <a:p>
-      <a:pPr>
-        <a:defRPr/>
-      </a:pPr>
-      <a:endParaRPr lang="it-IT"/>
-    </a:p>
-  </c:txPr>
-  <c:externalData r:id="rId3">
-    <c:autoUpdate val="0"/>
-  </c:externalData>
-</c:chartSpace>
+          </cx:spPr>
+          <cx:dataId val="0"/>
+          <cx:layoutPr>
+            <cx:visibility meanLine="0" meanMarker="1" nonoutliers="0" outliers="1"/>
+            <cx:statistics quartileMethod="exclusive"/>
+          </cx:layoutPr>
+        </cx:series>
+        <cx:series layoutId="boxWhisker" uniqueId="{82FE1B9C-B0F4-4132-9F57-BFACD046E501}">
+          <cx:tx>
+            <cx:txData>
+              <cx:f>Foglio1!$C$1</cx:f>
+              <cx:v/>
+            </cx:txData>
+          </cx:tx>
+          <cx:dataId val="1"/>
+          <cx:layoutPr>
+            <cx:visibility meanLine="0" meanMarker="1" nonoutliers="0" outliers="1"/>
+            <cx:statistics quartileMethod="exclusive"/>
+          </cx:layoutPr>
+        </cx:series>
+        <cx:series layoutId="boxWhisker" uniqueId="{B3511C08-CAE0-4501-941B-9AC2F49F1DF5}">
+          <cx:tx>
+            <cx:txData>
+              <cx:f>Foglio1!$D$1</cx:f>
+              <cx:v/>
+            </cx:txData>
+          </cx:tx>
+          <cx:dataId val="2"/>
+          <cx:layoutPr>
+            <cx:visibility meanLine="0" meanMarker="1" nonoutliers="0" outliers="1"/>
+            <cx:statistics quartileMethod="exclusive"/>
+          </cx:layoutPr>
+        </cx:series>
+      </cx:plotAreaRegion>
+      <cx:axis id="0">
+        <cx:catScaling gapWidth="1"/>
+        <cx:tickLabels/>
+      </cx:axis>
+      <cx:axis id="1">
+        <cx:valScaling/>
+        <cx:majorGridlines/>
+        <cx:tickLabels/>
+      </cx:axis>
+    </cx:plotArea>
+  </cx:chart>
+</cx:chartSpace>
 </file>
 
 <file path=ppt/charts/colors1.xml><?xml version="1.0" encoding="utf-8"?>
@@ -1558,10 +1445,13 @@
 </file>
 
 <file path=ppt/charts/colors2.xml><?xml version="1.0" encoding="utf-8"?>
-<cs:colorStyle xmlns:cs="http://schemas.microsoft.com/office/drawing/2012/chartStyle" xmlns:a="http://schemas.openxmlformats.org/drawingml/2006/main" meth="cycle" id="13">
+<cs:colorStyle xmlns:cs="http://schemas.microsoft.com/office/drawing/2012/chartStyle" xmlns:a="http://schemas.openxmlformats.org/drawingml/2006/main" meth="cycle" id="10">
+  <a:schemeClr val="accent1"/>
+  <a:schemeClr val="accent2"/>
+  <a:schemeClr val="accent3"/>
+  <a:schemeClr val="accent4"/>
+  <a:schemeClr val="accent5"/>
   <a:schemeClr val="accent6"/>
-  <a:schemeClr val="accent5"/>
-  <a:schemeClr val="accent4"/>
   <cs:variation/>
   <cs:variation>
     <a:lumMod val="60000"/>
@@ -2114,7 +2004,7 @@
 </file>
 
 <file path=ppt/charts/style2.xml><?xml version="1.0" encoding="utf-8"?>
-<cs:chartStyle xmlns:cs="http://schemas.microsoft.com/office/drawing/2012/chartStyle" xmlns:a="http://schemas.openxmlformats.org/drawingml/2006/main" id="297">
+<cs:chartStyle xmlns:cs="http://schemas.microsoft.com/office/drawing/2012/chartStyle" xmlns:a="http://schemas.openxmlformats.org/drawingml/2006/main" id="406">
   <cs:axisTitle>
     <cs:lnRef idx="0"/>
     <cs:fillRef idx="0"/>
@@ -2125,7 +2015,7 @@
         <a:lumOff val="35000"/>
       </a:schemeClr>
     </cs:fontRef>
-    <cs:defRPr sz="1330" kern="1200"/>
+    <cs:defRPr sz="1197"/>
   </cs:axisTitle>
   <cs:categoryAxis>
     <cs:lnRef idx="0"/>
@@ -2148,7 +2038,7 @@
         <a:round/>
       </a:ln>
     </cs:spPr>
-    <cs:defRPr sz="1197" kern="1200"/>
+    <cs:defRPr sz="1197"/>
   </cs:categoryAxis>
   <cs:chartArea mods="allowNoFillOverride allowNoLineOverride">
     <cs:lnRef idx="0"/>
@@ -2171,7 +2061,7 @@
         <a:round/>
       </a:ln>
     </cs:spPr>
-    <cs:defRPr sz="1330" kern="1200"/>
+    <cs:defRPr sz="1330"/>
   </cs:chartArea>
   <cs:dataLabel>
     <cs:lnRef idx="0"/>
@@ -2179,11 +2069,11 @@
     <cs:effectRef idx="0"/>
     <cs:fontRef idx="minor">
       <a:schemeClr val="tx1">
-        <a:lumMod val="75000"/>
-        <a:lumOff val="25000"/>
+        <a:lumMod val="65000"/>
+        <a:lumOff val="35000"/>
       </a:schemeClr>
     </cs:fontRef>
-    <cs:defRPr sz="1197" kern="1200"/>
+    <cs:defRPr sz="1197"/>
   </cs:dataLabel>
   <cs:dataLabelCallout>
     <cs:lnRef idx="0"/>
@@ -2208,36 +2098,53 @@
         </a:solidFill>
       </a:ln>
     </cs:spPr>
-    <cs:defRPr sz="1197" kern="1200"/>
+    <cs:defRPr sz="1197"/>
     <cs:bodyPr rot="0" spcFirstLastPara="1" vertOverflow="clip" horzOverflow="clip" vert="horz" wrap="square" lIns="36576" tIns="18288" rIns="36576" bIns="18288" anchor="ctr" anchorCtr="1">
       <a:spAutoFit/>
     </cs:bodyPr>
   </cs:dataLabelCallout>
   <cs:dataPoint>
-    <cs:lnRef idx="0"/>
-    <cs:fillRef idx="1">
+    <cs:lnRef idx="0">
+      <cs:styleClr val="auto"/>
+    </cs:lnRef>
+    <cs:fillRef idx="0">
       <cs:styleClr val="auto"/>
     </cs:fillRef>
     <cs:effectRef idx="0"/>
     <cs:fontRef idx="minor">
       <a:schemeClr val="tx1"/>
     </cs:fontRef>
+    <cs:spPr>
+      <a:solidFill>
+        <a:schemeClr val="phClr"/>
+      </a:solidFill>
+      <a:ln>
+        <a:solidFill>
+          <a:schemeClr val="phClr"/>
+        </a:solidFill>
+      </a:ln>
+    </cs:spPr>
   </cs:dataPoint>
   <cs:dataPoint3D>
     <cs:lnRef idx="0"/>
-    <cs:fillRef idx="1">
+    <cs:fillRef idx="0">
       <cs:styleClr val="auto"/>
     </cs:fillRef>
     <cs:effectRef idx="0"/>
     <cs:fontRef idx="minor">
       <a:schemeClr val="tx1"/>
     </cs:fontRef>
+    <cs:spPr>
+      <a:solidFill>
+        <a:schemeClr val="phClr"/>
+      </a:solidFill>
+    </cs:spPr>
   </cs:dataPoint3D>
   <cs:dataPointLine>
     <cs:lnRef idx="0">
       <cs:styleClr val="auto"/>
     </cs:lnRef>
-    <cs:fillRef idx="1"/>
+    <cs:fillRef idx="0"/>
     <cs:effectRef idx="0"/>
     <cs:fontRef idx="minor">
       <a:schemeClr val="tx1"/>
@@ -2252,10 +2159,8 @@
     </cs:spPr>
   </cs:dataPointLine>
   <cs:dataPointMarker>
-    <cs:lnRef idx="0">
-      <cs:styleClr val="auto"/>
-    </cs:lnRef>
-    <cs:fillRef idx="1">
+    <cs:lnRef idx="0"/>
+    <cs:fillRef idx="0">
       <cs:styleClr val="auto"/>
     </cs:fillRef>
     <cs:effectRef idx="0"/>
@@ -2263,9 +2168,12 @@
       <a:schemeClr val="tx1"/>
     </cs:fontRef>
     <cs:spPr>
+      <a:solidFill>
+        <a:schemeClr val="phClr"/>
+      </a:solidFill>
       <a:ln w="9525">
         <a:solidFill>
-          <a:schemeClr val="phClr"/>
+          <a:schemeClr val="lt1"/>
         </a:solidFill>
       </a:ln>
     </cs:spPr>
@@ -2275,13 +2183,13 @@
     <cs:lnRef idx="0">
       <cs:styleClr val="auto"/>
     </cs:lnRef>
-    <cs:fillRef idx="1"/>
+    <cs:fillRef idx="0"/>
     <cs:effectRef idx="0"/>
     <cs:fontRef idx="minor">
       <a:schemeClr val="tx1"/>
     </cs:fontRef>
     <cs:spPr>
-      <a:ln w="9525" cap="rnd">
+      <a:ln w="28575" cap="rnd">
         <a:solidFill>
           <a:schemeClr val="phClr"/>
         </a:solidFill>
@@ -2300,41 +2208,38 @@
       </a:schemeClr>
     </cs:fontRef>
     <cs:spPr>
-      <a:noFill/>
-      <a:ln w="9525" cap="flat" cmpd="sng" algn="ctr">
+      <a:ln w="9525">
         <a:solidFill>
           <a:schemeClr val="tx1">
             <a:lumMod val="15000"/>
             <a:lumOff val="85000"/>
           </a:schemeClr>
         </a:solidFill>
-        <a:round/>
       </a:ln>
     </cs:spPr>
-    <cs:defRPr sz="1197" kern="1200"/>
+    <cs:defRPr sz="1197"/>
   </cs:dataTable>
   <cs:downBar>
     <cs:lnRef idx="0"/>
     <cs:fillRef idx="0"/>
     <cs:effectRef idx="0"/>
     <cs:fontRef idx="minor">
-      <a:schemeClr val="tx1"/>
+      <a:schemeClr val="dk1"/>
     </cs:fontRef>
     <cs:spPr>
       <a:solidFill>
         <a:schemeClr val="dk1">
-          <a:lumMod val="75000"/>
-          <a:lumOff val="25000"/>
+          <a:lumMod val="65000"/>
+          <a:lumOff val="35000"/>
         </a:schemeClr>
       </a:solidFill>
-      <a:ln w="9525" cap="flat" cmpd="sng" algn="ctr">
+      <a:ln w="9525">
         <a:solidFill>
           <a:schemeClr val="tx1">
             <a:lumMod val="65000"/>
             <a:lumOff val="35000"/>
           </a:schemeClr>
         </a:solidFill>
-        <a:round/>
       </a:ln>
     </cs:spPr>
   </cs:downBar>
@@ -2383,12 +2288,6 @@
     <cs:fontRef idx="minor">
       <a:schemeClr val="tx1"/>
     </cs:fontRef>
-    <cs:spPr>
-      <a:noFill/>
-      <a:ln>
-        <a:noFill/>
-      </a:ln>
-    </cs:spPr>
   </cs:floor>
   <cs:gridlineMajor>
     <cs:lnRef idx="0"/>
@@ -2420,8 +2319,8 @@
       <a:ln w="9525" cap="flat" cmpd="sng" algn="ctr">
         <a:solidFill>
           <a:schemeClr val="tx1">
-            <a:lumMod val="5000"/>
-            <a:lumOff val="95000"/>
+            <a:lumMod val="15000"/>
+            <a:lumOff val="85000"/>
           </a:schemeClr>
         </a:solidFill>
         <a:round/>
@@ -2439,8 +2338,8 @@
       <a:ln w="9525" cap="flat" cmpd="sng" algn="ctr">
         <a:solidFill>
           <a:schemeClr val="tx1">
-            <a:lumMod val="50000"/>
-            <a:lumOff val="50000"/>
+            <a:lumMod val="75000"/>
+            <a:lumOff val="25000"/>
           </a:schemeClr>
         </a:solidFill>
         <a:round/>
@@ -2476,7 +2375,7 @@
         <a:lumOff val="35000"/>
       </a:schemeClr>
     </cs:fontRef>
-    <cs:defRPr sz="1197" kern="1200"/>
+    <cs:defRPr sz="1197"/>
   </cs:legend>
   <cs:plotArea mods="allowNoFillOverride allowNoLineOverride">
     <cs:lnRef idx="0"/>
@@ -2504,7 +2403,18 @@
         <a:lumOff val="35000"/>
       </a:schemeClr>
     </cs:fontRef>
-    <cs:defRPr sz="1197" kern="1200"/>
+    <cs:spPr>
+      <a:ln w="9525" cap="flat" cmpd="sng" algn="ctr">
+        <a:solidFill>
+          <a:schemeClr val="tx1">
+            <a:lumMod val="15000"/>
+            <a:lumOff val="85000"/>
+          </a:schemeClr>
+        </a:solidFill>
+        <a:round/>
+      </a:ln>
+    </cs:spPr>
+    <cs:defRPr sz="1197"/>
   </cs:seriesAxis>
   <cs:seriesLine>
     <cs:lnRef idx="0"/>
@@ -2514,12 +2424,9 @@
       <a:schemeClr val="tx1"/>
     </cs:fontRef>
     <cs:spPr>
-      <a:ln w="9525" cap="flat" cmpd="sng" algn="ctr">
+      <a:ln w="9525" cap="flat">
         <a:solidFill>
-          <a:schemeClr val="tx1">
-            <a:lumMod val="35000"/>
-            <a:lumOff val="65000"/>
-          </a:schemeClr>
+          <a:srgbClr val="D9D9D9"/>
         </a:solidFill>
         <a:round/>
       </a:ln>
@@ -2535,7 +2442,7 @@
         <a:lumOff val="35000"/>
       </a:schemeClr>
     </cs:fontRef>
-    <cs:defRPr sz="1862" b="0" kern="1200" spc="0" baseline="0"/>
+    <cs:defRPr sz="1862"/>
   </cs:title>
   <cs:trendline>
     <cs:lnRef idx="0">
@@ -2551,7 +2458,7 @@
         <a:solidFill>
           <a:schemeClr val="phClr"/>
         </a:solidFill>
-        <a:prstDash val="sysDot"/>
+        <a:prstDash val="sysDash"/>
       </a:ln>
     </cs:spPr>
   </cs:trendline>
@@ -2565,27 +2472,26 @@
         <a:lumOff val="35000"/>
       </a:schemeClr>
     </cs:fontRef>
-    <cs:defRPr sz="1197" kern="1200"/>
+    <cs:defRPr sz="1197"/>
   </cs:trendlineLabel>
   <cs:upBar>
     <cs:lnRef idx="0"/>
     <cs:fillRef idx="0"/>
     <cs:effectRef idx="0"/>
     <cs:fontRef idx="minor">
-      <a:schemeClr val="tx1"/>
+      <a:schemeClr val="dk1"/>
     </cs:fontRef>
     <cs:spPr>
       <a:solidFill>
         <a:schemeClr val="lt1"/>
       </a:solidFill>
-      <a:ln w="9525" cap="flat" cmpd="sng" algn="ctr">
+      <a:ln w="9525">
         <a:solidFill>
           <a:schemeClr val="tx1">
-            <a:lumMod val="65000"/>
-            <a:lumOff val="35000"/>
+            <a:lumMod val="15000"/>
+            <a:lumOff val="85000"/>
           </a:schemeClr>
         </a:solidFill>
-        <a:round/>
       </a:ln>
     </cs:spPr>
   </cs:upBar>
@@ -2599,7 +2505,7 @@
         <a:lumOff val="35000"/>
       </a:schemeClr>
     </cs:fontRef>
-    <cs:defRPr sz="1197" kern="1200"/>
+    <cs:defRPr sz="1197"/>
   </cs:valueAxis>
   <cs:wall>
     <cs:lnRef idx="0"/>
@@ -2608,12 +2514,6 @@
     <cs:fontRef idx="minor">
       <a:schemeClr val="tx1"/>
     </cs:fontRef>
-    <cs:spPr>
-      <a:noFill/>
-      <a:ln>
-        <a:noFill/>
-      </a:ln>
-    </cs:spPr>
   </cs:wall>
 </cs:chartStyle>
 </file>
@@ -11949,34 +11849,6 @@
           </a:graphicData>
         </a:graphic>
       </p:graphicFrame>
-      <p:graphicFrame>
-        <p:nvGraphicFramePr>
-          <p:cNvPr id="38" name="Grafico 37">
-            <a:extLst>
-              <a:ext uri="{FF2B5EF4-FFF2-40B4-BE49-F238E27FC236}">
-                <a16:creationId xmlns:a16="http://schemas.microsoft.com/office/drawing/2014/main" id="{68CCAF06-542D-4D9E-9095-8254313BA808}"/>
-              </a:ext>
-            </a:extLst>
-          </p:cNvPr>
-          <p:cNvGraphicFramePr/>
-          <p:nvPr>
-            <p:extLst>
-              <p:ext uri="{D42A27DB-BD31-4B8C-83A1-F6EECF244321}">
-                <p14:modId xmlns:p14="http://schemas.microsoft.com/office/powerpoint/2010/main" val="3303697057"/>
-              </p:ext>
-            </p:extLst>
-          </p:nvPr>
-        </p:nvGraphicFramePr>
-        <p:xfrm>
-          <a:off x="4591666" y="2343354"/>
-          <a:ext cx="4434347" cy="2707966"/>
-        </p:xfrm>
-        <a:graphic>
-          <a:graphicData uri="http://schemas.openxmlformats.org/drawingml/2006/chart">
-            <c:chart xmlns:c="http://schemas.openxmlformats.org/drawingml/2006/chart" xmlns:r="http://schemas.openxmlformats.org/officeDocument/2006/relationships" r:id="rId4"/>
-          </a:graphicData>
-        </a:graphic>
-      </p:graphicFrame>
       <p:sp>
         <p:nvSpPr>
           <p:cNvPr id="40" name="CasellaDiTesto 39">
@@ -11991,7 +11863,7 @@
         </p:nvSpPr>
         <p:spPr>
           <a:xfrm>
-            <a:off x="3923071" y="5815471"/>
+            <a:off x="3932904" y="5877939"/>
             <a:ext cx="3382297" cy="369332"/>
           </a:xfrm>
           <a:prstGeom prst="rect">
@@ -12047,6 +11919,70 @@
           </a:p>
         </p:txBody>
       </p:sp>
+      <mc:AlternateContent xmlns:mc="http://schemas.openxmlformats.org/markup-compatibility/2006">
+        <mc:Choice xmlns:cx1="http://schemas.microsoft.com/office/drawing/2015/9/8/chartex" Requires="cx1">
+          <p:graphicFrame>
+            <p:nvGraphicFramePr>
+              <p:cNvPr id="5" name="Grafico 4">
+                <a:extLst>
+                  <a:ext uri="{FF2B5EF4-FFF2-40B4-BE49-F238E27FC236}">
+                    <a16:creationId xmlns:a16="http://schemas.microsoft.com/office/drawing/2014/main" id="{58A950E3-CDA0-4ACD-9082-7621EE27180C}"/>
+                  </a:ext>
+                </a:extLst>
+              </p:cNvPr>
+              <p:cNvGraphicFramePr/>
+              <p:nvPr>
+                <p:extLst>
+                  <p:ext uri="{D42A27DB-BD31-4B8C-83A1-F6EECF244321}">
+                    <p14:modId xmlns:p14="http://schemas.microsoft.com/office/powerpoint/2010/main" val="647009208"/>
+                  </p:ext>
+                </p:extLst>
+              </p:nvPr>
+            </p:nvGraphicFramePr>
+            <p:xfrm>
+              <a:off x="4591669" y="2123768"/>
+              <a:ext cx="4141567" cy="3387708"/>
+            </p:xfrm>
+            <a:graphic>
+              <a:graphicData uri="http://schemas.microsoft.com/office/drawing/2014/chartex">
+                <cx:chart xmlns:cx="http://schemas.microsoft.com/office/drawing/2014/chartex" xmlns:r="http://schemas.openxmlformats.org/officeDocument/2006/relationships" r:id="rId4"/>
+              </a:graphicData>
+            </a:graphic>
+          </p:graphicFrame>
+        </mc:Choice>
+        <mc:Fallback>
+          <p:pic>
+            <p:nvPicPr>
+              <p:cNvPr id="5" name="Grafico 4">
+                <a:extLst>
+                  <a:ext uri="{FF2B5EF4-FFF2-40B4-BE49-F238E27FC236}">
+                    <a16:creationId xmlns:a16="http://schemas.microsoft.com/office/drawing/2014/main" id="{58A950E3-CDA0-4ACD-9082-7621EE27180C}"/>
+                  </a:ext>
+                </a:extLst>
+              </p:cNvPr>
+              <p:cNvPicPr>
+                <a:picLocks noGrp="1" noRot="1" noChangeAspect="1" noMove="1" noResize="1" noEditPoints="1" noAdjustHandles="1" noChangeArrowheads="1" noChangeShapeType="1"/>
+              </p:cNvPicPr>
+              <p:nvPr/>
+            </p:nvPicPr>
+            <p:blipFill>
+              <a:blip r:embed="rId5"/>
+              <a:stretch>
+                <a:fillRect/>
+              </a:stretch>
+            </p:blipFill>
+            <p:spPr>
+              <a:xfrm>
+                <a:off x="4591669" y="2123768"/>
+                <a:ext cx="4141567" cy="3387708"/>
+              </a:xfrm>
+              <a:prstGeom prst="rect">
+                <a:avLst/>
+              </a:prstGeom>
+            </p:spPr>
+          </p:pic>
+        </mc:Fallback>
+      </mc:AlternateContent>
     </p:spTree>
     <p:extLst>
       <p:ext uri="{BB962C8B-B14F-4D97-AF65-F5344CB8AC3E}">

</xml_diff>